<commit_message>
decided on how to present research
</commit_message>
<xml_diff>
--- a/files/warmingfig1.pptx
+++ b/files/warmingfig1.pptx
@@ -2,7 +2,7 @@
 <file path=ppt/presentation.xml><?xml version="1.0" encoding="utf-8"?>
 <p:presentation xmlns:a="http://schemas.openxmlformats.org/drawingml/2006/main" xmlns:r="http://schemas.openxmlformats.org/officeDocument/2006/relationships" xmlns:p="http://schemas.openxmlformats.org/presentationml/2006/main" saveSubsetFonts="1">
   <p:sldMasterIdLst>
-    <p:sldMasterId id="2147483684" r:id="rId1"/>
+    <p:sldMasterId id="2147483696" r:id="rId1"/>
   </p:sldMasterIdLst>
   <p:notesMasterIdLst>
     <p:notesMasterId r:id="rId3"/>
@@ -10,7 +10,7 @@
   <p:sldIdLst>
     <p:sldId id="256" r:id="rId2"/>
   </p:sldIdLst>
-  <p:sldSz cx="9686925" cy="8999538"/>
+  <p:sldSz cx="8640763" cy="6480175"/>
   <p:notesSz cx="6858000" cy="9144000"/>
   <p:defaultTextStyle>
     <a:defPPr>
@@ -197,7 +197,7 @@
           <a:p>
             <a:fld id="{AD8C6DF0-5141-454C-A359-D648E603EBD4}" type="datetimeFigureOut">
               <a:rPr lang="en-CH" smtClean="0"/>
-              <a:t>30/03/2024</a:t>
+              <a:t>01/04/2024</a:t>
             </a:fld>
             <a:endParaRPr lang="en-CH"/>
           </a:p>
@@ -215,8 +215,8 @@
         </p:nvSpPr>
         <p:spPr>
           <a:xfrm>
-            <a:off x="1768475" y="1143000"/>
-            <a:ext cx="3321050" cy="3086100"/>
+            <a:off x="1371600" y="1143000"/>
+            <a:ext cx="4114800" cy="3086100"/>
           </a:xfrm>
           <a:prstGeom prst="rect">
             <a:avLst/>
@@ -371,8 +371,8 @@
   </p:cSld>
   <p:clrMap bg1="lt1" tx1="dk1" bg2="lt2" tx2="dk2" accent1="accent1" accent2="accent2" accent3="accent3" accent4="accent4" accent5="accent5" accent6="accent6" hlink="hlink" folHlink="folHlink"/>
   <p:notesStyle>
-    <a:lvl1pPr marL="0" algn="l" defTabSz="914400" rtl="0" eaLnBrk="1" latinLnBrk="0" hangingPunct="1">
-      <a:defRPr sz="1200" kern="1200">
+    <a:lvl1pPr marL="0" algn="l" defTabSz="739841" rtl="0" eaLnBrk="1" latinLnBrk="0" hangingPunct="1">
+      <a:defRPr sz="971" kern="1200">
         <a:solidFill>
           <a:schemeClr val="tx1"/>
         </a:solidFill>
@@ -381,8 +381,8 @@
         <a:cs typeface="+mn-cs"/>
       </a:defRPr>
     </a:lvl1pPr>
-    <a:lvl2pPr marL="457200" algn="l" defTabSz="914400" rtl="0" eaLnBrk="1" latinLnBrk="0" hangingPunct="1">
-      <a:defRPr sz="1200" kern="1200">
+    <a:lvl2pPr marL="369921" algn="l" defTabSz="739841" rtl="0" eaLnBrk="1" latinLnBrk="0" hangingPunct="1">
+      <a:defRPr sz="971" kern="1200">
         <a:solidFill>
           <a:schemeClr val="tx1"/>
         </a:solidFill>
@@ -391,8 +391,8 @@
         <a:cs typeface="+mn-cs"/>
       </a:defRPr>
     </a:lvl2pPr>
-    <a:lvl3pPr marL="914400" algn="l" defTabSz="914400" rtl="0" eaLnBrk="1" latinLnBrk="0" hangingPunct="1">
-      <a:defRPr sz="1200" kern="1200">
+    <a:lvl3pPr marL="739841" algn="l" defTabSz="739841" rtl="0" eaLnBrk="1" latinLnBrk="0" hangingPunct="1">
+      <a:defRPr sz="971" kern="1200">
         <a:solidFill>
           <a:schemeClr val="tx1"/>
         </a:solidFill>
@@ -401,8 +401,8 @@
         <a:cs typeface="+mn-cs"/>
       </a:defRPr>
     </a:lvl3pPr>
-    <a:lvl4pPr marL="1371600" algn="l" defTabSz="914400" rtl="0" eaLnBrk="1" latinLnBrk="0" hangingPunct="1">
-      <a:defRPr sz="1200" kern="1200">
+    <a:lvl4pPr marL="1109762" algn="l" defTabSz="739841" rtl="0" eaLnBrk="1" latinLnBrk="0" hangingPunct="1">
+      <a:defRPr sz="971" kern="1200">
         <a:solidFill>
           <a:schemeClr val="tx1"/>
         </a:solidFill>
@@ -411,8 +411,8 @@
         <a:cs typeface="+mn-cs"/>
       </a:defRPr>
     </a:lvl4pPr>
-    <a:lvl5pPr marL="1828800" algn="l" defTabSz="914400" rtl="0" eaLnBrk="1" latinLnBrk="0" hangingPunct="1">
-      <a:defRPr sz="1200" kern="1200">
+    <a:lvl5pPr marL="1479682" algn="l" defTabSz="739841" rtl="0" eaLnBrk="1" latinLnBrk="0" hangingPunct="1">
+      <a:defRPr sz="971" kern="1200">
         <a:solidFill>
           <a:schemeClr val="tx1"/>
         </a:solidFill>
@@ -421,8 +421,8 @@
         <a:cs typeface="+mn-cs"/>
       </a:defRPr>
     </a:lvl5pPr>
-    <a:lvl6pPr marL="2286000" algn="l" defTabSz="914400" rtl="0" eaLnBrk="1" latinLnBrk="0" hangingPunct="1">
-      <a:defRPr sz="1200" kern="1200">
+    <a:lvl6pPr marL="1849603" algn="l" defTabSz="739841" rtl="0" eaLnBrk="1" latinLnBrk="0" hangingPunct="1">
+      <a:defRPr sz="971" kern="1200">
         <a:solidFill>
           <a:schemeClr val="tx1"/>
         </a:solidFill>
@@ -431,8 +431,8 @@
         <a:cs typeface="+mn-cs"/>
       </a:defRPr>
     </a:lvl6pPr>
-    <a:lvl7pPr marL="2743200" algn="l" defTabSz="914400" rtl="0" eaLnBrk="1" latinLnBrk="0" hangingPunct="1">
-      <a:defRPr sz="1200" kern="1200">
+    <a:lvl7pPr marL="2219523" algn="l" defTabSz="739841" rtl="0" eaLnBrk="1" latinLnBrk="0" hangingPunct="1">
+      <a:defRPr sz="971" kern="1200">
         <a:solidFill>
           <a:schemeClr val="tx1"/>
         </a:solidFill>
@@ -441,8 +441,8 @@
         <a:cs typeface="+mn-cs"/>
       </a:defRPr>
     </a:lvl7pPr>
-    <a:lvl8pPr marL="3200400" algn="l" defTabSz="914400" rtl="0" eaLnBrk="1" latinLnBrk="0" hangingPunct="1">
-      <a:defRPr sz="1200" kern="1200">
+    <a:lvl8pPr marL="2589444" algn="l" defTabSz="739841" rtl="0" eaLnBrk="1" latinLnBrk="0" hangingPunct="1">
+      <a:defRPr sz="971" kern="1200">
         <a:solidFill>
           <a:schemeClr val="tx1"/>
         </a:solidFill>
@@ -451,8 +451,8 @@
         <a:cs typeface="+mn-cs"/>
       </a:defRPr>
     </a:lvl8pPr>
-    <a:lvl9pPr marL="3657600" algn="l" defTabSz="914400" rtl="0" eaLnBrk="1" latinLnBrk="0" hangingPunct="1">
-      <a:defRPr sz="1200" kern="1200">
+    <a:lvl9pPr marL="2959364" algn="l" defTabSz="739841" rtl="0" eaLnBrk="1" latinLnBrk="0" hangingPunct="1">
+      <a:defRPr sz="971" kern="1200">
         <a:solidFill>
           <a:schemeClr val="tx1"/>
         </a:solidFill>
@@ -494,15 +494,15 @@
         </p:nvSpPr>
         <p:spPr>
           <a:xfrm>
-            <a:off x="726520" y="1472842"/>
-            <a:ext cx="8233886" cy="3133172"/>
+            <a:off x="648057" y="1060529"/>
+            <a:ext cx="7344649" cy="2256061"/>
           </a:xfrm>
         </p:spPr>
         <p:txBody>
           <a:bodyPr anchor="b"/>
           <a:lstStyle>
             <a:lvl1pPr algn="ctr">
-              <a:defRPr sz="6356"/>
+              <a:defRPr sz="5669"/>
             </a:lvl1pPr>
           </a:lstStyle>
           <a:p>
@@ -526,8 +526,8 @@
         </p:nvSpPr>
         <p:spPr>
           <a:xfrm>
-            <a:off x="1210866" y="4726842"/>
-            <a:ext cx="7265194" cy="2172804"/>
+            <a:off x="1080096" y="3403592"/>
+            <a:ext cx="6480572" cy="1564542"/>
           </a:xfrm>
         </p:spPr>
         <p:txBody>
@@ -535,39 +535,39 @@
           <a:lstStyle>
             <a:lvl1pPr marL="0" indent="0" algn="ctr">
               <a:buNone/>
-              <a:defRPr sz="2543"/>
+              <a:defRPr sz="2268"/>
             </a:lvl1pPr>
-            <a:lvl2pPr marL="484358" indent="0" algn="ctr">
-              <a:buNone/>
-              <a:defRPr sz="2119"/>
+            <a:lvl2pPr marL="432008" indent="0" algn="ctr">
+              <a:buNone/>
+              <a:defRPr sz="1890"/>
             </a:lvl2pPr>
-            <a:lvl3pPr marL="968715" indent="0" algn="ctr">
-              <a:buNone/>
-              <a:defRPr sz="1907"/>
+            <a:lvl3pPr marL="864017" indent="0" algn="ctr">
+              <a:buNone/>
+              <a:defRPr sz="1701"/>
             </a:lvl3pPr>
-            <a:lvl4pPr marL="1453073" indent="0" algn="ctr">
-              <a:buNone/>
-              <a:defRPr sz="1695"/>
+            <a:lvl4pPr marL="1296025" indent="0" algn="ctr">
+              <a:buNone/>
+              <a:defRPr sz="1512"/>
             </a:lvl4pPr>
-            <a:lvl5pPr marL="1937431" indent="0" algn="ctr">
-              <a:buNone/>
-              <a:defRPr sz="1695"/>
+            <a:lvl5pPr marL="1728033" indent="0" algn="ctr">
+              <a:buNone/>
+              <a:defRPr sz="1512"/>
             </a:lvl5pPr>
-            <a:lvl6pPr marL="2421788" indent="0" algn="ctr">
-              <a:buNone/>
-              <a:defRPr sz="1695"/>
+            <a:lvl6pPr marL="2160041" indent="0" algn="ctr">
+              <a:buNone/>
+              <a:defRPr sz="1512"/>
             </a:lvl6pPr>
-            <a:lvl7pPr marL="2906146" indent="0" algn="ctr">
-              <a:buNone/>
-              <a:defRPr sz="1695"/>
+            <a:lvl7pPr marL="2592050" indent="0" algn="ctr">
+              <a:buNone/>
+              <a:defRPr sz="1512"/>
             </a:lvl7pPr>
-            <a:lvl8pPr marL="3390504" indent="0" algn="ctr">
-              <a:buNone/>
-              <a:defRPr sz="1695"/>
+            <a:lvl8pPr marL="3024058" indent="0" algn="ctr">
+              <a:buNone/>
+              <a:defRPr sz="1512"/>
             </a:lvl8pPr>
-            <a:lvl9pPr marL="3874861" indent="0" algn="ctr">
-              <a:buNone/>
-              <a:defRPr sz="1695"/>
+            <a:lvl9pPr marL="3456066" indent="0" algn="ctr">
+              <a:buNone/>
+              <a:defRPr sz="1512"/>
             </a:lvl9pPr>
           </a:lstStyle>
           <a:p>
@@ -596,7 +596,7 @@
           <a:p>
             <a:fld id="{E1DA2BB2-5327-4862-ABF1-61CE3737D6AA}" type="datetimeFigureOut">
               <a:rPr lang="en-CH" smtClean="0"/>
-              <a:t>30/03/2024</a:t>
+              <a:t>01/04/2024</a:t>
             </a:fld>
             <a:endParaRPr lang="en-CH"/>
           </a:p>
@@ -647,7 +647,7 @@
     </p:spTree>
     <p:extLst>
       <p:ext uri="{BB962C8B-B14F-4D97-AF65-F5344CB8AC3E}">
-        <p14:creationId xmlns:p14="http://schemas.microsoft.com/office/powerpoint/2010/main" val="127611641"/>
+        <p14:creationId xmlns:p14="http://schemas.microsoft.com/office/powerpoint/2010/main" val="3828912229"/>
       </p:ext>
     </p:extLst>
   </p:cSld>
@@ -766,7 +766,7 @@
           <a:p>
             <a:fld id="{E1DA2BB2-5327-4862-ABF1-61CE3737D6AA}" type="datetimeFigureOut">
               <a:rPr lang="en-CH" smtClean="0"/>
-              <a:t>30/03/2024</a:t>
+              <a:t>01/04/2024</a:t>
             </a:fld>
             <a:endParaRPr lang="en-CH"/>
           </a:p>
@@ -817,7 +817,7 @@
     </p:spTree>
     <p:extLst>
       <p:ext uri="{BB962C8B-B14F-4D97-AF65-F5344CB8AC3E}">
-        <p14:creationId xmlns:p14="http://schemas.microsoft.com/office/powerpoint/2010/main" val="271752932"/>
+        <p14:creationId xmlns:p14="http://schemas.microsoft.com/office/powerpoint/2010/main" val="3867585351"/>
       </p:ext>
     </p:extLst>
   </p:cSld>
@@ -856,8 +856,8 @@
         </p:nvSpPr>
         <p:spPr>
           <a:xfrm>
-            <a:off x="6932206" y="479142"/>
-            <a:ext cx="2088743" cy="7626692"/>
+            <a:off x="6183546" y="345009"/>
+            <a:ext cx="1863165" cy="5491649"/>
           </a:xfrm>
         </p:spPr>
         <p:txBody>
@@ -884,8 +884,8 @@
         </p:nvSpPr>
         <p:spPr>
           <a:xfrm>
-            <a:off x="665977" y="479142"/>
-            <a:ext cx="6145143" cy="7626692"/>
+            <a:off x="594053" y="345009"/>
+            <a:ext cx="5481484" cy="5491649"/>
           </a:xfrm>
         </p:spPr>
         <p:txBody>
@@ -946,7 +946,7 @@
           <a:p>
             <a:fld id="{E1DA2BB2-5327-4862-ABF1-61CE3737D6AA}" type="datetimeFigureOut">
               <a:rPr lang="en-CH" smtClean="0"/>
-              <a:t>30/03/2024</a:t>
+              <a:t>01/04/2024</a:t>
             </a:fld>
             <a:endParaRPr lang="en-CH"/>
           </a:p>
@@ -997,7 +997,7 @@
     </p:spTree>
     <p:extLst>
       <p:ext uri="{BB962C8B-B14F-4D97-AF65-F5344CB8AC3E}">
-        <p14:creationId xmlns:p14="http://schemas.microsoft.com/office/powerpoint/2010/main" val="3079584365"/>
+        <p14:creationId xmlns:p14="http://schemas.microsoft.com/office/powerpoint/2010/main" val="337709684"/>
       </p:ext>
     </p:extLst>
   </p:cSld>
@@ -1116,7 +1116,7 @@
           <a:p>
             <a:fld id="{E1DA2BB2-5327-4862-ABF1-61CE3737D6AA}" type="datetimeFigureOut">
               <a:rPr lang="en-CH" smtClean="0"/>
-              <a:t>30/03/2024</a:t>
+              <a:t>01/04/2024</a:t>
             </a:fld>
             <a:endParaRPr lang="en-CH"/>
           </a:p>
@@ -1167,7 +1167,7 @@
     </p:spTree>
     <p:extLst>
       <p:ext uri="{BB962C8B-B14F-4D97-AF65-F5344CB8AC3E}">
-        <p14:creationId xmlns:p14="http://schemas.microsoft.com/office/powerpoint/2010/main" val="4127676772"/>
+        <p14:creationId xmlns:p14="http://schemas.microsoft.com/office/powerpoint/2010/main" val="2475543496"/>
       </p:ext>
     </p:extLst>
   </p:cSld>
@@ -1206,15 +1206,15 @@
         </p:nvSpPr>
         <p:spPr>
           <a:xfrm>
-            <a:off x="660931" y="2243638"/>
-            <a:ext cx="8354973" cy="3743557"/>
+            <a:off x="589553" y="1615546"/>
+            <a:ext cx="7452658" cy="2695572"/>
           </a:xfrm>
         </p:spPr>
         <p:txBody>
           <a:bodyPr anchor="b"/>
           <a:lstStyle>
             <a:lvl1pPr>
-              <a:defRPr sz="6356"/>
+              <a:defRPr sz="5669"/>
             </a:lvl1pPr>
           </a:lstStyle>
           <a:p>
@@ -1238,8 +1238,8 @@
         </p:nvSpPr>
         <p:spPr>
           <a:xfrm>
-            <a:off x="660931" y="6022610"/>
-            <a:ext cx="8354973" cy="1968648"/>
+            <a:off x="589553" y="4336619"/>
+            <a:ext cx="7452658" cy="1417538"/>
           </a:xfrm>
         </p:spPr>
         <p:txBody>
@@ -1247,15 +1247,15 @@
           <a:lstStyle>
             <a:lvl1pPr marL="0" indent="0">
               <a:buNone/>
-              <a:defRPr sz="2543">
+              <a:defRPr sz="2268">
                 <a:solidFill>
                   <a:schemeClr val="tx1"/>
                 </a:solidFill>
               </a:defRPr>
             </a:lvl1pPr>
-            <a:lvl2pPr marL="484358" indent="0">
-              <a:buNone/>
-              <a:defRPr sz="2119">
+            <a:lvl2pPr marL="432008" indent="0">
+              <a:buNone/>
+              <a:defRPr sz="1890">
                 <a:solidFill>
                   <a:schemeClr val="tx1">
                     <a:tint val="75000"/>
@@ -1263,9 +1263,9 @@
                 </a:solidFill>
               </a:defRPr>
             </a:lvl2pPr>
-            <a:lvl3pPr marL="968715" indent="0">
-              <a:buNone/>
-              <a:defRPr sz="1907">
+            <a:lvl3pPr marL="864017" indent="0">
+              <a:buNone/>
+              <a:defRPr sz="1701">
                 <a:solidFill>
                   <a:schemeClr val="tx1">
                     <a:tint val="75000"/>
@@ -1273,9 +1273,9 @@
                 </a:solidFill>
               </a:defRPr>
             </a:lvl3pPr>
-            <a:lvl4pPr marL="1453073" indent="0">
-              <a:buNone/>
-              <a:defRPr sz="1695">
+            <a:lvl4pPr marL="1296025" indent="0">
+              <a:buNone/>
+              <a:defRPr sz="1512">
                 <a:solidFill>
                   <a:schemeClr val="tx1">
                     <a:tint val="75000"/>
@@ -1283,9 +1283,9 @@
                 </a:solidFill>
               </a:defRPr>
             </a:lvl4pPr>
-            <a:lvl5pPr marL="1937431" indent="0">
-              <a:buNone/>
-              <a:defRPr sz="1695">
+            <a:lvl5pPr marL="1728033" indent="0">
+              <a:buNone/>
+              <a:defRPr sz="1512">
                 <a:solidFill>
                   <a:schemeClr val="tx1">
                     <a:tint val="75000"/>
@@ -1293,9 +1293,9 @@
                 </a:solidFill>
               </a:defRPr>
             </a:lvl5pPr>
-            <a:lvl6pPr marL="2421788" indent="0">
-              <a:buNone/>
-              <a:defRPr sz="1695">
+            <a:lvl6pPr marL="2160041" indent="0">
+              <a:buNone/>
+              <a:defRPr sz="1512">
                 <a:solidFill>
                   <a:schemeClr val="tx1">
                     <a:tint val="75000"/>
@@ -1303,9 +1303,9 @@
                 </a:solidFill>
               </a:defRPr>
             </a:lvl6pPr>
-            <a:lvl7pPr marL="2906146" indent="0">
-              <a:buNone/>
-              <a:defRPr sz="1695">
+            <a:lvl7pPr marL="2592050" indent="0">
+              <a:buNone/>
+              <a:defRPr sz="1512">
                 <a:solidFill>
                   <a:schemeClr val="tx1">
                     <a:tint val="75000"/>
@@ -1313,9 +1313,9 @@
                 </a:solidFill>
               </a:defRPr>
             </a:lvl7pPr>
-            <a:lvl8pPr marL="3390504" indent="0">
-              <a:buNone/>
-              <a:defRPr sz="1695">
+            <a:lvl8pPr marL="3024058" indent="0">
+              <a:buNone/>
+              <a:defRPr sz="1512">
                 <a:solidFill>
                   <a:schemeClr val="tx1">
                     <a:tint val="75000"/>
@@ -1323,9 +1323,9 @@
                 </a:solidFill>
               </a:defRPr>
             </a:lvl8pPr>
-            <a:lvl9pPr marL="3874861" indent="0">
-              <a:buNone/>
-              <a:defRPr sz="1695">
+            <a:lvl9pPr marL="3456066" indent="0">
+              <a:buNone/>
+              <a:defRPr sz="1512">
                 <a:solidFill>
                   <a:schemeClr val="tx1">
                     <a:tint val="75000"/>
@@ -1360,7 +1360,7 @@
           <a:p>
             <a:fld id="{E1DA2BB2-5327-4862-ABF1-61CE3737D6AA}" type="datetimeFigureOut">
               <a:rPr lang="en-CH" smtClean="0"/>
-              <a:t>30/03/2024</a:t>
+              <a:t>01/04/2024</a:t>
             </a:fld>
             <a:endParaRPr lang="en-CH"/>
           </a:p>
@@ -1411,7 +1411,7 @@
     </p:spTree>
     <p:extLst>
       <p:ext uri="{BB962C8B-B14F-4D97-AF65-F5344CB8AC3E}">
-        <p14:creationId xmlns:p14="http://schemas.microsoft.com/office/powerpoint/2010/main" val="628150937"/>
+        <p14:creationId xmlns:p14="http://schemas.microsoft.com/office/powerpoint/2010/main" val="1815155661"/>
       </p:ext>
     </p:extLst>
   </p:cSld>
@@ -1473,8 +1473,8 @@
         </p:nvSpPr>
         <p:spPr>
           <a:xfrm>
-            <a:off x="665976" y="2395710"/>
-            <a:ext cx="4116943" cy="5710124"/>
+            <a:off x="594053" y="1725046"/>
+            <a:ext cx="3672324" cy="4111612"/>
           </a:xfrm>
         </p:spPr>
         <p:txBody>
@@ -1530,8 +1530,8 @@
         </p:nvSpPr>
         <p:spPr>
           <a:xfrm>
-            <a:off x="4904006" y="2395710"/>
-            <a:ext cx="4116943" cy="5710124"/>
+            <a:off x="4374386" y="1725046"/>
+            <a:ext cx="3672324" cy="4111612"/>
           </a:xfrm>
         </p:spPr>
         <p:txBody>
@@ -1592,7 +1592,7 @@
           <a:p>
             <a:fld id="{E1DA2BB2-5327-4862-ABF1-61CE3737D6AA}" type="datetimeFigureOut">
               <a:rPr lang="en-CH" smtClean="0"/>
-              <a:t>30/03/2024</a:t>
+              <a:t>01/04/2024</a:t>
             </a:fld>
             <a:endParaRPr lang="en-CH"/>
           </a:p>
@@ -1643,7 +1643,7 @@
     </p:spTree>
     <p:extLst>
       <p:ext uri="{BB962C8B-B14F-4D97-AF65-F5344CB8AC3E}">
-        <p14:creationId xmlns:p14="http://schemas.microsoft.com/office/powerpoint/2010/main" val="2678697702"/>
+        <p14:creationId xmlns:p14="http://schemas.microsoft.com/office/powerpoint/2010/main" val="392334737"/>
       </p:ext>
     </p:extLst>
   </p:cSld>
@@ -1682,8 +1682,8 @@
         </p:nvSpPr>
         <p:spPr>
           <a:xfrm>
-            <a:off x="667238" y="479144"/>
-            <a:ext cx="8354973" cy="1739495"/>
+            <a:off x="595178" y="345011"/>
+            <a:ext cx="7452658" cy="1252534"/>
           </a:xfrm>
         </p:spPr>
         <p:txBody>
@@ -1710,8 +1710,8 @@
         </p:nvSpPr>
         <p:spPr>
           <a:xfrm>
-            <a:off x="667239" y="2206137"/>
-            <a:ext cx="4098023" cy="1081194"/>
+            <a:off x="595179" y="1588543"/>
+            <a:ext cx="3655447" cy="778521"/>
           </a:xfrm>
         </p:spPr>
         <p:txBody>
@@ -1719,39 +1719,39 @@
           <a:lstStyle>
             <a:lvl1pPr marL="0" indent="0">
               <a:buNone/>
-              <a:defRPr sz="2543" b="1"/>
+              <a:defRPr sz="2268" b="1"/>
             </a:lvl1pPr>
-            <a:lvl2pPr marL="484358" indent="0">
-              <a:buNone/>
-              <a:defRPr sz="2119" b="1"/>
+            <a:lvl2pPr marL="432008" indent="0">
+              <a:buNone/>
+              <a:defRPr sz="1890" b="1"/>
             </a:lvl2pPr>
-            <a:lvl3pPr marL="968715" indent="0">
-              <a:buNone/>
-              <a:defRPr sz="1907" b="1"/>
+            <a:lvl3pPr marL="864017" indent="0">
+              <a:buNone/>
+              <a:defRPr sz="1701" b="1"/>
             </a:lvl3pPr>
-            <a:lvl4pPr marL="1453073" indent="0">
-              <a:buNone/>
-              <a:defRPr sz="1695" b="1"/>
+            <a:lvl4pPr marL="1296025" indent="0">
+              <a:buNone/>
+              <a:defRPr sz="1512" b="1"/>
             </a:lvl4pPr>
-            <a:lvl5pPr marL="1937431" indent="0">
-              <a:buNone/>
-              <a:defRPr sz="1695" b="1"/>
+            <a:lvl5pPr marL="1728033" indent="0">
+              <a:buNone/>
+              <a:defRPr sz="1512" b="1"/>
             </a:lvl5pPr>
-            <a:lvl6pPr marL="2421788" indent="0">
-              <a:buNone/>
-              <a:defRPr sz="1695" b="1"/>
+            <a:lvl6pPr marL="2160041" indent="0">
+              <a:buNone/>
+              <a:defRPr sz="1512" b="1"/>
             </a:lvl6pPr>
-            <a:lvl7pPr marL="2906146" indent="0">
-              <a:buNone/>
-              <a:defRPr sz="1695" b="1"/>
+            <a:lvl7pPr marL="2592050" indent="0">
+              <a:buNone/>
+              <a:defRPr sz="1512" b="1"/>
             </a:lvl7pPr>
-            <a:lvl8pPr marL="3390504" indent="0">
-              <a:buNone/>
-              <a:defRPr sz="1695" b="1"/>
+            <a:lvl8pPr marL="3024058" indent="0">
+              <a:buNone/>
+              <a:defRPr sz="1512" b="1"/>
             </a:lvl8pPr>
-            <a:lvl9pPr marL="3874861" indent="0">
-              <a:buNone/>
-              <a:defRPr sz="1695" b="1"/>
+            <a:lvl9pPr marL="3456066" indent="0">
+              <a:buNone/>
+              <a:defRPr sz="1512" b="1"/>
             </a:lvl9pPr>
           </a:lstStyle>
           <a:p>
@@ -1775,8 +1775,8 @@
         </p:nvSpPr>
         <p:spPr>
           <a:xfrm>
-            <a:off x="667239" y="3287331"/>
-            <a:ext cx="4098023" cy="4835169"/>
+            <a:off x="595179" y="2367064"/>
+            <a:ext cx="3655447" cy="3481594"/>
           </a:xfrm>
         </p:spPr>
         <p:txBody>
@@ -1832,8 +1832,8 @@
         </p:nvSpPr>
         <p:spPr>
           <a:xfrm>
-            <a:off x="4904006" y="2206137"/>
-            <a:ext cx="4118205" cy="1081194"/>
+            <a:off x="4374387" y="1588543"/>
+            <a:ext cx="3673450" cy="778521"/>
           </a:xfrm>
         </p:spPr>
         <p:txBody>
@@ -1841,39 +1841,39 @@
           <a:lstStyle>
             <a:lvl1pPr marL="0" indent="0">
               <a:buNone/>
-              <a:defRPr sz="2543" b="1"/>
+              <a:defRPr sz="2268" b="1"/>
             </a:lvl1pPr>
-            <a:lvl2pPr marL="484358" indent="0">
-              <a:buNone/>
-              <a:defRPr sz="2119" b="1"/>
+            <a:lvl2pPr marL="432008" indent="0">
+              <a:buNone/>
+              <a:defRPr sz="1890" b="1"/>
             </a:lvl2pPr>
-            <a:lvl3pPr marL="968715" indent="0">
-              <a:buNone/>
-              <a:defRPr sz="1907" b="1"/>
+            <a:lvl3pPr marL="864017" indent="0">
+              <a:buNone/>
+              <a:defRPr sz="1701" b="1"/>
             </a:lvl3pPr>
-            <a:lvl4pPr marL="1453073" indent="0">
-              <a:buNone/>
-              <a:defRPr sz="1695" b="1"/>
+            <a:lvl4pPr marL="1296025" indent="0">
+              <a:buNone/>
+              <a:defRPr sz="1512" b="1"/>
             </a:lvl4pPr>
-            <a:lvl5pPr marL="1937431" indent="0">
-              <a:buNone/>
-              <a:defRPr sz="1695" b="1"/>
+            <a:lvl5pPr marL="1728033" indent="0">
+              <a:buNone/>
+              <a:defRPr sz="1512" b="1"/>
             </a:lvl5pPr>
-            <a:lvl6pPr marL="2421788" indent="0">
-              <a:buNone/>
-              <a:defRPr sz="1695" b="1"/>
+            <a:lvl6pPr marL="2160041" indent="0">
+              <a:buNone/>
+              <a:defRPr sz="1512" b="1"/>
             </a:lvl6pPr>
-            <a:lvl7pPr marL="2906146" indent="0">
-              <a:buNone/>
-              <a:defRPr sz="1695" b="1"/>
+            <a:lvl7pPr marL="2592050" indent="0">
+              <a:buNone/>
+              <a:defRPr sz="1512" b="1"/>
             </a:lvl7pPr>
-            <a:lvl8pPr marL="3390504" indent="0">
-              <a:buNone/>
-              <a:defRPr sz="1695" b="1"/>
+            <a:lvl8pPr marL="3024058" indent="0">
+              <a:buNone/>
+              <a:defRPr sz="1512" b="1"/>
             </a:lvl8pPr>
-            <a:lvl9pPr marL="3874861" indent="0">
-              <a:buNone/>
-              <a:defRPr sz="1695" b="1"/>
+            <a:lvl9pPr marL="3456066" indent="0">
+              <a:buNone/>
+              <a:defRPr sz="1512" b="1"/>
             </a:lvl9pPr>
           </a:lstStyle>
           <a:p>
@@ -1897,8 +1897,8 @@
         </p:nvSpPr>
         <p:spPr>
           <a:xfrm>
-            <a:off x="4904006" y="3287331"/>
-            <a:ext cx="4118205" cy="4835169"/>
+            <a:off x="4374387" y="2367064"/>
+            <a:ext cx="3673450" cy="3481594"/>
           </a:xfrm>
         </p:spPr>
         <p:txBody>
@@ -1959,7 +1959,7 @@
           <a:p>
             <a:fld id="{E1DA2BB2-5327-4862-ABF1-61CE3737D6AA}" type="datetimeFigureOut">
               <a:rPr lang="en-CH" smtClean="0"/>
-              <a:t>30/03/2024</a:t>
+              <a:t>01/04/2024</a:t>
             </a:fld>
             <a:endParaRPr lang="en-CH"/>
           </a:p>
@@ -2010,7 +2010,7 @@
     </p:spTree>
     <p:extLst>
       <p:ext uri="{BB962C8B-B14F-4D97-AF65-F5344CB8AC3E}">
-        <p14:creationId xmlns:p14="http://schemas.microsoft.com/office/powerpoint/2010/main" val="1698965417"/>
+        <p14:creationId xmlns:p14="http://schemas.microsoft.com/office/powerpoint/2010/main" val="1978939285"/>
       </p:ext>
     </p:extLst>
   </p:cSld>
@@ -2077,7 +2077,7 @@
           <a:p>
             <a:fld id="{E1DA2BB2-5327-4862-ABF1-61CE3737D6AA}" type="datetimeFigureOut">
               <a:rPr lang="en-CH" smtClean="0"/>
-              <a:t>30/03/2024</a:t>
+              <a:t>01/04/2024</a:t>
             </a:fld>
             <a:endParaRPr lang="en-CH"/>
           </a:p>
@@ -2128,7 +2128,7 @@
     </p:spTree>
     <p:extLst>
       <p:ext uri="{BB962C8B-B14F-4D97-AF65-F5344CB8AC3E}">
-        <p14:creationId xmlns:p14="http://schemas.microsoft.com/office/powerpoint/2010/main" val="2854074512"/>
+        <p14:creationId xmlns:p14="http://schemas.microsoft.com/office/powerpoint/2010/main" val="2759227837"/>
       </p:ext>
     </p:extLst>
   </p:cSld>
@@ -2172,7 +2172,7 @@
           <a:p>
             <a:fld id="{E1DA2BB2-5327-4862-ABF1-61CE3737D6AA}" type="datetimeFigureOut">
               <a:rPr lang="en-CH" smtClean="0"/>
-              <a:t>30/03/2024</a:t>
+              <a:t>01/04/2024</a:t>
             </a:fld>
             <a:endParaRPr lang="en-CH"/>
           </a:p>
@@ -2223,7 +2223,7 @@
     </p:spTree>
     <p:extLst>
       <p:ext uri="{BB962C8B-B14F-4D97-AF65-F5344CB8AC3E}">
-        <p14:creationId xmlns:p14="http://schemas.microsoft.com/office/powerpoint/2010/main" val="1743473388"/>
+        <p14:creationId xmlns:p14="http://schemas.microsoft.com/office/powerpoint/2010/main" val="1836926388"/>
       </p:ext>
     </p:extLst>
   </p:cSld>
@@ -2262,15 +2262,15 @@
         </p:nvSpPr>
         <p:spPr>
           <a:xfrm>
-            <a:off x="667238" y="599969"/>
-            <a:ext cx="3124285" cy="2099892"/>
+            <a:off x="595178" y="432012"/>
+            <a:ext cx="2786871" cy="1512041"/>
           </a:xfrm>
         </p:spPr>
         <p:txBody>
           <a:bodyPr anchor="b"/>
           <a:lstStyle>
             <a:lvl1pPr>
-              <a:defRPr sz="3390"/>
+              <a:defRPr sz="3024"/>
             </a:lvl1pPr>
           </a:lstStyle>
           <a:p>
@@ -2294,39 +2294,39 @@
         </p:nvSpPr>
         <p:spPr>
           <a:xfrm>
-            <a:off x="4118205" y="1295769"/>
-            <a:ext cx="4904006" cy="6395505"/>
+            <a:off x="3673450" y="933027"/>
+            <a:ext cx="4374386" cy="4605124"/>
           </a:xfrm>
         </p:spPr>
         <p:txBody>
           <a:bodyPr/>
           <a:lstStyle>
             <a:lvl1pPr>
-              <a:defRPr sz="3390"/>
+              <a:defRPr sz="3024"/>
             </a:lvl1pPr>
             <a:lvl2pPr>
-              <a:defRPr sz="2966"/>
+              <a:defRPr sz="2646"/>
             </a:lvl2pPr>
             <a:lvl3pPr>
-              <a:defRPr sz="2543"/>
+              <a:defRPr sz="2268"/>
             </a:lvl3pPr>
             <a:lvl4pPr>
-              <a:defRPr sz="2119"/>
+              <a:defRPr sz="1890"/>
             </a:lvl4pPr>
             <a:lvl5pPr>
-              <a:defRPr sz="2119"/>
+              <a:defRPr sz="1890"/>
             </a:lvl5pPr>
             <a:lvl6pPr>
-              <a:defRPr sz="2119"/>
+              <a:defRPr sz="1890"/>
             </a:lvl6pPr>
             <a:lvl7pPr>
-              <a:defRPr sz="2119"/>
+              <a:defRPr sz="1890"/>
             </a:lvl7pPr>
             <a:lvl8pPr>
-              <a:defRPr sz="2119"/>
+              <a:defRPr sz="1890"/>
             </a:lvl8pPr>
             <a:lvl9pPr>
-              <a:defRPr sz="2119"/>
+              <a:defRPr sz="1890"/>
             </a:lvl9pPr>
           </a:lstStyle>
           <a:p>
@@ -2379,8 +2379,8 @@
         </p:nvSpPr>
         <p:spPr>
           <a:xfrm>
-            <a:off x="667238" y="2699862"/>
-            <a:ext cx="3124285" cy="5001827"/>
+            <a:off x="595178" y="1944052"/>
+            <a:ext cx="2786871" cy="3601598"/>
           </a:xfrm>
         </p:spPr>
         <p:txBody>
@@ -2388,39 +2388,39 @@
           <a:lstStyle>
             <a:lvl1pPr marL="0" indent="0">
               <a:buNone/>
-              <a:defRPr sz="1695"/>
+              <a:defRPr sz="1512"/>
             </a:lvl1pPr>
-            <a:lvl2pPr marL="484358" indent="0">
-              <a:buNone/>
-              <a:defRPr sz="1483"/>
+            <a:lvl2pPr marL="432008" indent="0">
+              <a:buNone/>
+              <a:defRPr sz="1323"/>
             </a:lvl2pPr>
-            <a:lvl3pPr marL="968715" indent="0">
-              <a:buNone/>
-              <a:defRPr sz="1271"/>
+            <a:lvl3pPr marL="864017" indent="0">
+              <a:buNone/>
+              <a:defRPr sz="1134"/>
             </a:lvl3pPr>
-            <a:lvl4pPr marL="1453073" indent="0">
-              <a:buNone/>
-              <a:defRPr sz="1059"/>
+            <a:lvl4pPr marL="1296025" indent="0">
+              <a:buNone/>
+              <a:defRPr sz="945"/>
             </a:lvl4pPr>
-            <a:lvl5pPr marL="1937431" indent="0">
-              <a:buNone/>
-              <a:defRPr sz="1059"/>
+            <a:lvl5pPr marL="1728033" indent="0">
+              <a:buNone/>
+              <a:defRPr sz="945"/>
             </a:lvl5pPr>
-            <a:lvl6pPr marL="2421788" indent="0">
-              <a:buNone/>
-              <a:defRPr sz="1059"/>
+            <a:lvl6pPr marL="2160041" indent="0">
+              <a:buNone/>
+              <a:defRPr sz="945"/>
             </a:lvl6pPr>
-            <a:lvl7pPr marL="2906146" indent="0">
-              <a:buNone/>
-              <a:defRPr sz="1059"/>
+            <a:lvl7pPr marL="2592050" indent="0">
+              <a:buNone/>
+              <a:defRPr sz="945"/>
             </a:lvl7pPr>
-            <a:lvl8pPr marL="3390504" indent="0">
-              <a:buNone/>
-              <a:defRPr sz="1059"/>
+            <a:lvl8pPr marL="3024058" indent="0">
+              <a:buNone/>
+              <a:defRPr sz="945"/>
             </a:lvl8pPr>
-            <a:lvl9pPr marL="3874861" indent="0">
-              <a:buNone/>
-              <a:defRPr sz="1059"/>
+            <a:lvl9pPr marL="3456066" indent="0">
+              <a:buNone/>
+              <a:defRPr sz="945"/>
             </a:lvl9pPr>
           </a:lstStyle>
           <a:p>
@@ -2449,7 +2449,7 @@
           <a:p>
             <a:fld id="{E1DA2BB2-5327-4862-ABF1-61CE3737D6AA}" type="datetimeFigureOut">
               <a:rPr lang="en-CH" smtClean="0"/>
-              <a:t>30/03/2024</a:t>
+              <a:t>01/04/2024</a:t>
             </a:fld>
             <a:endParaRPr lang="en-CH"/>
           </a:p>
@@ -2500,7 +2500,7 @@
     </p:spTree>
     <p:extLst>
       <p:ext uri="{BB962C8B-B14F-4D97-AF65-F5344CB8AC3E}">
-        <p14:creationId xmlns:p14="http://schemas.microsoft.com/office/powerpoint/2010/main" val="2927748973"/>
+        <p14:creationId xmlns:p14="http://schemas.microsoft.com/office/powerpoint/2010/main" val="4093673699"/>
       </p:ext>
     </p:extLst>
   </p:cSld>
@@ -2539,15 +2539,15 @@
         </p:nvSpPr>
         <p:spPr>
           <a:xfrm>
-            <a:off x="667238" y="599969"/>
-            <a:ext cx="3124285" cy="2099892"/>
+            <a:off x="595178" y="432012"/>
+            <a:ext cx="2786871" cy="1512041"/>
           </a:xfrm>
         </p:spPr>
         <p:txBody>
           <a:bodyPr anchor="b"/>
           <a:lstStyle>
             <a:lvl1pPr>
-              <a:defRPr sz="3390"/>
+              <a:defRPr sz="3024"/>
             </a:lvl1pPr>
           </a:lstStyle>
           <a:p>
@@ -2571,8 +2571,8 @@
         </p:nvSpPr>
         <p:spPr>
           <a:xfrm>
-            <a:off x="4118205" y="1295769"/>
-            <a:ext cx="4904006" cy="6395505"/>
+            <a:off x="3673450" y="933027"/>
+            <a:ext cx="4374386" cy="4605124"/>
           </a:xfrm>
         </p:spPr>
         <p:txBody>
@@ -2580,39 +2580,39 @@
           <a:lstStyle>
             <a:lvl1pPr marL="0" indent="0">
               <a:buNone/>
-              <a:defRPr sz="3390"/>
+              <a:defRPr sz="3024"/>
             </a:lvl1pPr>
-            <a:lvl2pPr marL="484358" indent="0">
-              <a:buNone/>
-              <a:defRPr sz="2966"/>
+            <a:lvl2pPr marL="432008" indent="0">
+              <a:buNone/>
+              <a:defRPr sz="2646"/>
             </a:lvl2pPr>
-            <a:lvl3pPr marL="968715" indent="0">
-              <a:buNone/>
-              <a:defRPr sz="2543"/>
+            <a:lvl3pPr marL="864017" indent="0">
+              <a:buNone/>
+              <a:defRPr sz="2268"/>
             </a:lvl3pPr>
-            <a:lvl4pPr marL="1453073" indent="0">
-              <a:buNone/>
-              <a:defRPr sz="2119"/>
+            <a:lvl4pPr marL="1296025" indent="0">
+              <a:buNone/>
+              <a:defRPr sz="1890"/>
             </a:lvl4pPr>
-            <a:lvl5pPr marL="1937431" indent="0">
-              <a:buNone/>
-              <a:defRPr sz="2119"/>
+            <a:lvl5pPr marL="1728033" indent="0">
+              <a:buNone/>
+              <a:defRPr sz="1890"/>
             </a:lvl5pPr>
-            <a:lvl6pPr marL="2421788" indent="0">
-              <a:buNone/>
-              <a:defRPr sz="2119"/>
+            <a:lvl6pPr marL="2160041" indent="0">
+              <a:buNone/>
+              <a:defRPr sz="1890"/>
             </a:lvl6pPr>
-            <a:lvl7pPr marL="2906146" indent="0">
-              <a:buNone/>
-              <a:defRPr sz="2119"/>
+            <a:lvl7pPr marL="2592050" indent="0">
+              <a:buNone/>
+              <a:defRPr sz="1890"/>
             </a:lvl7pPr>
-            <a:lvl8pPr marL="3390504" indent="0">
-              <a:buNone/>
-              <a:defRPr sz="2119"/>
+            <a:lvl8pPr marL="3024058" indent="0">
+              <a:buNone/>
+              <a:defRPr sz="1890"/>
             </a:lvl8pPr>
-            <a:lvl9pPr marL="3874861" indent="0">
-              <a:buNone/>
-              <a:defRPr sz="2119"/>
+            <a:lvl9pPr marL="3456066" indent="0">
+              <a:buNone/>
+              <a:defRPr sz="1890"/>
             </a:lvl9pPr>
           </a:lstStyle>
           <a:p>
@@ -2636,8 +2636,8 @@
         </p:nvSpPr>
         <p:spPr>
           <a:xfrm>
-            <a:off x="667238" y="2699862"/>
-            <a:ext cx="3124285" cy="5001827"/>
+            <a:off x="595178" y="1944052"/>
+            <a:ext cx="2786871" cy="3601598"/>
           </a:xfrm>
         </p:spPr>
         <p:txBody>
@@ -2645,39 +2645,39 @@
           <a:lstStyle>
             <a:lvl1pPr marL="0" indent="0">
               <a:buNone/>
-              <a:defRPr sz="1695"/>
+              <a:defRPr sz="1512"/>
             </a:lvl1pPr>
-            <a:lvl2pPr marL="484358" indent="0">
-              <a:buNone/>
-              <a:defRPr sz="1483"/>
+            <a:lvl2pPr marL="432008" indent="0">
+              <a:buNone/>
+              <a:defRPr sz="1323"/>
             </a:lvl2pPr>
-            <a:lvl3pPr marL="968715" indent="0">
-              <a:buNone/>
-              <a:defRPr sz="1271"/>
+            <a:lvl3pPr marL="864017" indent="0">
+              <a:buNone/>
+              <a:defRPr sz="1134"/>
             </a:lvl3pPr>
-            <a:lvl4pPr marL="1453073" indent="0">
-              <a:buNone/>
-              <a:defRPr sz="1059"/>
+            <a:lvl4pPr marL="1296025" indent="0">
+              <a:buNone/>
+              <a:defRPr sz="945"/>
             </a:lvl4pPr>
-            <a:lvl5pPr marL="1937431" indent="0">
-              <a:buNone/>
-              <a:defRPr sz="1059"/>
+            <a:lvl5pPr marL="1728033" indent="0">
+              <a:buNone/>
+              <a:defRPr sz="945"/>
             </a:lvl5pPr>
-            <a:lvl6pPr marL="2421788" indent="0">
-              <a:buNone/>
-              <a:defRPr sz="1059"/>
+            <a:lvl6pPr marL="2160041" indent="0">
+              <a:buNone/>
+              <a:defRPr sz="945"/>
             </a:lvl6pPr>
-            <a:lvl7pPr marL="2906146" indent="0">
-              <a:buNone/>
-              <a:defRPr sz="1059"/>
+            <a:lvl7pPr marL="2592050" indent="0">
+              <a:buNone/>
+              <a:defRPr sz="945"/>
             </a:lvl7pPr>
-            <a:lvl8pPr marL="3390504" indent="0">
-              <a:buNone/>
-              <a:defRPr sz="1059"/>
+            <a:lvl8pPr marL="3024058" indent="0">
+              <a:buNone/>
+              <a:defRPr sz="945"/>
             </a:lvl8pPr>
-            <a:lvl9pPr marL="3874861" indent="0">
-              <a:buNone/>
-              <a:defRPr sz="1059"/>
+            <a:lvl9pPr marL="3456066" indent="0">
+              <a:buNone/>
+              <a:defRPr sz="945"/>
             </a:lvl9pPr>
           </a:lstStyle>
           <a:p>
@@ -2706,7 +2706,7 @@
           <a:p>
             <a:fld id="{E1DA2BB2-5327-4862-ABF1-61CE3737D6AA}" type="datetimeFigureOut">
               <a:rPr lang="en-CH" smtClean="0"/>
-              <a:t>30/03/2024</a:t>
+              <a:t>01/04/2024</a:t>
             </a:fld>
             <a:endParaRPr lang="en-CH"/>
           </a:p>
@@ -2757,7 +2757,7 @@
     </p:spTree>
     <p:extLst>
       <p:ext uri="{BB962C8B-B14F-4D97-AF65-F5344CB8AC3E}">
-        <p14:creationId xmlns:p14="http://schemas.microsoft.com/office/powerpoint/2010/main" val="2508790847"/>
+        <p14:creationId xmlns:p14="http://schemas.microsoft.com/office/powerpoint/2010/main" val="763731432"/>
       </p:ext>
     </p:extLst>
   </p:cSld>
@@ -2801,8 +2801,8 @@
         </p:nvSpPr>
         <p:spPr>
           <a:xfrm>
-            <a:off x="665976" y="479144"/>
-            <a:ext cx="8354973" cy="1739495"/>
+            <a:off x="594053" y="345011"/>
+            <a:ext cx="7452658" cy="1252534"/>
           </a:xfrm>
           <a:prstGeom prst="rect">
             <a:avLst/>
@@ -2834,8 +2834,8 @@
         </p:nvSpPr>
         <p:spPr>
           <a:xfrm>
-            <a:off x="665976" y="2395710"/>
-            <a:ext cx="8354973" cy="5710124"/>
+            <a:off x="594053" y="1725046"/>
+            <a:ext cx="7452658" cy="4111612"/>
           </a:xfrm>
           <a:prstGeom prst="rect">
             <a:avLst/>
@@ -2896,8 +2896,8 @@
         </p:nvSpPr>
         <p:spPr>
           <a:xfrm>
-            <a:off x="665976" y="8341240"/>
-            <a:ext cx="2179558" cy="479142"/>
+            <a:off x="594052" y="6006164"/>
+            <a:ext cx="1944172" cy="345009"/>
           </a:xfrm>
           <a:prstGeom prst="rect">
             <a:avLst/>
@@ -2907,7 +2907,7 @@
           <a:bodyPr vert="horz" lIns="91440" tIns="45720" rIns="91440" bIns="45720" rtlCol="0" anchor="ctr"/>
           <a:lstStyle>
             <a:lvl1pPr algn="l">
-              <a:defRPr sz="1271">
+              <a:defRPr sz="1134">
                 <a:solidFill>
                   <a:schemeClr val="tx1">
                     <a:tint val="75000"/>
@@ -2919,7 +2919,7 @@
           <a:p>
             <a:fld id="{E1DA2BB2-5327-4862-ABF1-61CE3737D6AA}" type="datetimeFigureOut">
               <a:rPr lang="en-CH" smtClean="0"/>
-              <a:t>30/03/2024</a:t>
+              <a:t>01/04/2024</a:t>
             </a:fld>
             <a:endParaRPr lang="en-CH"/>
           </a:p>
@@ -2937,8 +2937,8 @@
         </p:nvSpPr>
         <p:spPr>
           <a:xfrm>
-            <a:off x="3208794" y="8341240"/>
-            <a:ext cx="3269337" cy="479142"/>
+            <a:off x="2862253" y="6006164"/>
+            <a:ext cx="2916258" cy="345009"/>
           </a:xfrm>
           <a:prstGeom prst="rect">
             <a:avLst/>
@@ -2948,7 +2948,7 @@
           <a:bodyPr vert="horz" lIns="91440" tIns="45720" rIns="91440" bIns="45720" rtlCol="0" anchor="ctr"/>
           <a:lstStyle>
             <a:lvl1pPr algn="ctr">
-              <a:defRPr sz="1271">
+              <a:defRPr sz="1134">
                 <a:solidFill>
                   <a:schemeClr val="tx1">
                     <a:tint val="75000"/>
@@ -2974,8 +2974,8 @@
         </p:nvSpPr>
         <p:spPr>
           <a:xfrm>
-            <a:off x="6841391" y="8341240"/>
-            <a:ext cx="2179558" cy="479142"/>
+            <a:off x="6102539" y="6006164"/>
+            <a:ext cx="1944172" cy="345009"/>
           </a:xfrm>
           <a:prstGeom prst="rect">
             <a:avLst/>
@@ -2985,7 +2985,7 @@
           <a:bodyPr vert="horz" lIns="91440" tIns="45720" rIns="91440" bIns="45720" rtlCol="0" anchor="ctr"/>
           <a:lstStyle>
             <a:lvl1pPr algn="r">
-              <a:defRPr sz="1271">
+              <a:defRPr sz="1134">
                 <a:solidFill>
                   <a:schemeClr val="tx1">
                     <a:tint val="75000"/>
@@ -3006,27 +3006,27 @@
     </p:spTree>
     <p:extLst>
       <p:ext uri="{BB962C8B-B14F-4D97-AF65-F5344CB8AC3E}">
-        <p14:creationId xmlns:p14="http://schemas.microsoft.com/office/powerpoint/2010/main" val="338396259"/>
+        <p14:creationId xmlns:p14="http://schemas.microsoft.com/office/powerpoint/2010/main" val="1576639540"/>
       </p:ext>
     </p:extLst>
   </p:cSld>
   <p:clrMap bg1="lt1" tx1="dk1" bg2="lt2" tx2="dk2" accent1="accent1" accent2="accent2" accent3="accent3" accent4="accent4" accent5="accent5" accent6="accent6" hlink="hlink" folHlink="folHlink"/>
   <p:sldLayoutIdLst>
-    <p:sldLayoutId id="2147483685" r:id="rId1"/>
-    <p:sldLayoutId id="2147483686" r:id="rId2"/>
-    <p:sldLayoutId id="2147483687" r:id="rId3"/>
-    <p:sldLayoutId id="2147483688" r:id="rId4"/>
-    <p:sldLayoutId id="2147483689" r:id="rId5"/>
-    <p:sldLayoutId id="2147483690" r:id="rId6"/>
-    <p:sldLayoutId id="2147483691" r:id="rId7"/>
-    <p:sldLayoutId id="2147483692" r:id="rId8"/>
-    <p:sldLayoutId id="2147483693" r:id="rId9"/>
-    <p:sldLayoutId id="2147483694" r:id="rId10"/>
-    <p:sldLayoutId id="2147483695" r:id="rId11"/>
+    <p:sldLayoutId id="2147483697" r:id="rId1"/>
+    <p:sldLayoutId id="2147483698" r:id="rId2"/>
+    <p:sldLayoutId id="2147483699" r:id="rId3"/>
+    <p:sldLayoutId id="2147483700" r:id="rId4"/>
+    <p:sldLayoutId id="2147483701" r:id="rId5"/>
+    <p:sldLayoutId id="2147483702" r:id="rId6"/>
+    <p:sldLayoutId id="2147483703" r:id="rId7"/>
+    <p:sldLayoutId id="2147483704" r:id="rId8"/>
+    <p:sldLayoutId id="2147483705" r:id="rId9"/>
+    <p:sldLayoutId id="2147483706" r:id="rId10"/>
+    <p:sldLayoutId id="2147483707" r:id="rId11"/>
   </p:sldLayoutIdLst>
   <p:txStyles>
     <p:titleStyle>
-      <a:lvl1pPr algn="l" defTabSz="968715" rtl="0" eaLnBrk="1" latinLnBrk="0" hangingPunct="1">
+      <a:lvl1pPr algn="l" defTabSz="864017" rtl="0" eaLnBrk="1" latinLnBrk="0" hangingPunct="1">
         <a:lnSpc>
           <a:spcPct val="90000"/>
         </a:lnSpc>
@@ -3034,7 +3034,7 @@
           <a:spcPct val="0"/>
         </a:spcBef>
         <a:buNone/>
-        <a:defRPr sz="4661" kern="1200">
+        <a:defRPr sz="4158" kern="1200">
           <a:solidFill>
             <a:schemeClr val="tx1"/>
           </a:solidFill>
@@ -3045,16 +3045,16 @@
       </a:lvl1pPr>
     </p:titleStyle>
     <p:bodyStyle>
-      <a:lvl1pPr marL="242179" indent="-242179" algn="l" defTabSz="968715" rtl="0" eaLnBrk="1" latinLnBrk="0" hangingPunct="1">
+      <a:lvl1pPr marL="216004" indent="-216004" algn="l" defTabSz="864017" rtl="0" eaLnBrk="1" latinLnBrk="0" hangingPunct="1">
         <a:lnSpc>
           <a:spcPct val="90000"/>
         </a:lnSpc>
         <a:spcBef>
-          <a:spcPts val="1059"/>
+          <a:spcPts val="945"/>
         </a:spcBef>
         <a:buFont typeface="Arial" panose="020B0604020202020204" pitchFamily="34" charset="0"/>
         <a:buChar char="•"/>
-        <a:defRPr sz="2966" kern="1200">
+        <a:defRPr sz="2646" kern="1200">
           <a:solidFill>
             <a:schemeClr val="tx1"/>
           </a:solidFill>
@@ -3063,16 +3063,16 @@
           <a:cs typeface="+mn-cs"/>
         </a:defRPr>
       </a:lvl1pPr>
-      <a:lvl2pPr marL="726537" indent="-242179" algn="l" defTabSz="968715" rtl="0" eaLnBrk="1" latinLnBrk="0" hangingPunct="1">
+      <a:lvl2pPr marL="648012" indent="-216004" algn="l" defTabSz="864017" rtl="0" eaLnBrk="1" latinLnBrk="0" hangingPunct="1">
         <a:lnSpc>
           <a:spcPct val="90000"/>
         </a:lnSpc>
         <a:spcBef>
-          <a:spcPts val="530"/>
+          <a:spcPts val="472"/>
         </a:spcBef>
         <a:buFont typeface="Arial" panose="020B0604020202020204" pitchFamily="34" charset="0"/>
         <a:buChar char="•"/>
-        <a:defRPr sz="2543" kern="1200">
+        <a:defRPr sz="2268" kern="1200">
           <a:solidFill>
             <a:schemeClr val="tx1"/>
           </a:solidFill>
@@ -3081,16 +3081,16 @@
           <a:cs typeface="+mn-cs"/>
         </a:defRPr>
       </a:lvl2pPr>
-      <a:lvl3pPr marL="1210894" indent="-242179" algn="l" defTabSz="968715" rtl="0" eaLnBrk="1" latinLnBrk="0" hangingPunct="1">
+      <a:lvl3pPr marL="1080021" indent="-216004" algn="l" defTabSz="864017" rtl="0" eaLnBrk="1" latinLnBrk="0" hangingPunct="1">
         <a:lnSpc>
           <a:spcPct val="90000"/>
         </a:lnSpc>
         <a:spcBef>
-          <a:spcPts val="530"/>
+          <a:spcPts val="472"/>
         </a:spcBef>
         <a:buFont typeface="Arial" panose="020B0604020202020204" pitchFamily="34" charset="0"/>
         <a:buChar char="•"/>
-        <a:defRPr sz="2119" kern="1200">
+        <a:defRPr sz="1890" kern="1200">
           <a:solidFill>
             <a:schemeClr val="tx1"/>
           </a:solidFill>
@@ -3099,16 +3099,16 @@
           <a:cs typeface="+mn-cs"/>
         </a:defRPr>
       </a:lvl3pPr>
-      <a:lvl4pPr marL="1695252" indent="-242179" algn="l" defTabSz="968715" rtl="0" eaLnBrk="1" latinLnBrk="0" hangingPunct="1">
+      <a:lvl4pPr marL="1512029" indent="-216004" algn="l" defTabSz="864017" rtl="0" eaLnBrk="1" latinLnBrk="0" hangingPunct="1">
         <a:lnSpc>
           <a:spcPct val="90000"/>
         </a:lnSpc>
         <a:spcBef>
-          <a:spcPts val="530"/>
+          <a:spcPts val="472"/>
         </a:spcBef>
         <a:buFont typeface="Arial" panose="020B0604020202020204" pitchFamily="34" charset="0"/>
         <a:buChar char="•"/>
-        <a:defRPr sz="1907" kern="1200">
+        <a:defRPr sz="1701" kern="1200">
           <a:solidFill>
             <a:schemeClr val="tx1"/>
           </a:solidFill>
@@ -3117,16 +3117,16 @@
           <a:cs typeface="+mn-cs"/>
         </a:defRPr>
       </a:lvl4pPr>
-      <a:lvl5pPr marL="2179610" indent="-242179" algn="l" defTabSz="968715" rtl="0" eaLnBrk="1" latinLnBrk="0" hangingPunct="1">
+      <a:lvl5pPr marL="1944037" indent="-216004" algn="l" defTabSz="864017" rtl="0" eaLnBrk="1" latinLnBrk="0" hangingPunct="1">
         <a:lnSpc>
           <a:spcPct val="90000"/>
         </a:lnSpc>
         <a:spcBef>
-          <a:spcPts val="530"/>
+          <a:spcPts val="472"/>
         </a:spcBef>
         <a:buFont typeface="Arial" panose="020B0604020202020204" pitchFamily="34" charset="0"/>
         <a:buChar char="•"/>
-        <a:defRPr sz="1907" kern="1200">
+        <a:defRPr sz="1701" kern="1200">
           <a:solidFill>
             <a:schemeClr val="tx1"/>
           </a:solidFill>
@@ -3135,16 +3135,16 @@
           <a:cs typeface="+mn-cs"/>
         </a:defRPr>
       </a:lvl5pPr>
-      <a:lvl6pPr marL="2663967" indent="-242179" algn="l" defTabSz="968715" rtl="0" eaLnBrk="1" latinLnBrk="0" hangingPunct="1">
+      <a:lvl6pPr marL="2376046" indent="-216004" algn="l" defTabSz="864017" rtl="0" eaLnBrk="1" latinLnBrk="0" hangingPunct="1">
         <a:lnSpc>
           <a:spcPct val="90000"/>
         </a:lnSpc>
         <a:spcBef>
-          <a:spcPts val="530"/>
+          <a:spcPts val="472"/>
         </a:spcBef>
         <a:buFont typeface="Arial" panose="020B0604020202020204" pitchFamily="34" charset="0"/>
         <a:buChar char="•"/>
-        <a:defRPr sz="1907" kern="1200">
+        <a:defRPr sz="1701" kern="1200">
           <a:solidFill>
             <a:schemeClr val="tx1"/>
           </a:solidFill>
@@ -3153,16 +3153,16 @@
           <a:cs typeface="+mn-cs"/>
         </a:defRPr>
       </a:lvl6pPr>
-      <a:lvl7pPr marL="3148325" indent="-242179" algn="l" defTabSz="968715" rtl="0" eaLnBrk="1" latinLnBrk="0" hangingPunct="1">
+      <a:lvl7pPr marL="2808054" indent="-216004" algn="l" defTabSz="864017" rtl="0" eaLnBrk="1" latinLnBrk="0" hangingPunct="1">
         <a:lnSpc>
           <a:spcPct val="90000"/>
         </a:lnSpc>
         <a:spcBef>
-          <a:spcPts val="530"/>
+          <a:spcPts val="472"/>
         </a:spcBef>
         <a:buFont typeface="Arial" panose="020B0604020202020204" pitchFamily="34" charset="0"/>
         <a:buChar char="•"/>
-        <a:defRPr sz="1907" kern="1200">
+        <a:defRPr sz="1701" kern="1200">
           <a:solidFill>
             <a:schemeClr val="tx1"/>
           </a:solidFill>
@@ -3171,16 +3171,16 @@
           <a:cs typeface="+mn-cs"/>
         </a:defRPr>
       </a:lvl7pPr>
-      <a:lvl8pPr marL="3632683" indent="-242179" algn="l" defTabSz="968715" rtl="0" eaLnBrk="1" latinLnBrk="0" hangingPunct="1">
+      <a:lvl8pPr marL="3240062" indent="-216004" algn="l" defTabSz="864017" rtl="0" eaLnBrk="1" latinLnBrk="0" hangingPunct="1">
         <a:lnSpc>
           <a:spcPct val="90000"/>
         </a:lnSpc>
         <a:spcBef>
-          <a:spcPts val="530"/>
+          <a:spcPts val="472"/>
         </a:spcBef>
         <a:buFont typeface="Arial" panose="020B0604020202020204" pitchFamily="34" charset="0"/>
         <a:buChar char="•"/>
-        <a:defRPr sz="1907" kern="1200">
+        <a:defRPr sz="1701" kern="1200">
           <a:solidFill>
             <a:schemeClr val="tx1"/>
           </a:solidFill>
@@ -3189,16 +3189,16 @@
           <a:cs typeface="+mn-cs"/>
         </a:defRPr>
       </a:lvl8pPr>
-      <a:lvl9pPr marL="4117040" indent="-242179" algn="l" defTabSz="968715" rtl="0" eaLnBrk="1" latinLnBrk="0" hangingPunct="1">
+      <a:lvl9pPr marL="3672070" indent="-216004" algn="l" defTabSz="864017" rtl="0" eaLnBrk="1" latinLnBrk="0" hangingPunct="1">
         <a:lnSpc>
           <a:spcPct val="90000"/>
         </a:lnSpc>
         <a:spcBef>
-          <a:spcPts val="530"/>
+          <a:spcPts val="472"/>
         </a:spcBef>
         <a:buFont typeface="Arial" panose="020B0604020202020204" pitchFamily="34" charset="0"/>
         <a:buChar char="•"/>
-        <a:defRPr sz="1907" kern="1200">
+        <a:defRPr sz="1701" kern="1200">
           <a:solidFill>
             <a:schemeClr val="tx1"/>
           </a:solidFill>
@@ -3212,8 +3212,8 @@
       <a:defPPr>
         <a:defRPr lang="en-US"/>
       </a:defPPr>
-      <a:lvl1pPr marL="0" algn="l" defTabSz="968715" rtl="0" eaLnBrk="1" latinLnBrk="0" hangingPunct="1">
-        <a:defRPr sz="1907" kern="1200">
+      <a:lvl1pPr marL="0" algn="l" defTabSz="864017" rtl="0" eaLnBrk="1" latinLnBrk="0" hangingPunct="1">
+        <a:defRPr sz="1701" kern="1200">
           <a:solidFill>
             <a:schemeClr val="tx1"/>
           </a:solidFill>
@@ -3222,8 +3222,8 @@
           <a:cs typeface="+mn-cs"/>
         </a:defRPr>
       </a:lvl1pPr>
-      <a:lvl2pPr marL="484358" algn="l" defTabSz="968715" rtl="0" eaLnBrk="1" latinLnBrk="0" hangingPunct="1">
-        <a:defRPr sz="1907" kern="1200">
+      <a:lvl2pPr marL="432008" algn="l" defTabSz="864017" rtl="0" eaLnBrk="1" latinLnBrk="0" hangingPunct="1">
+        <a:defRPr sz="1701" kern="1200">
           <a:solidFill>
             <a:schemeClr val="tx1"/>
           </a:solidFill>
@@ -3232,8 +3232,8 @@
           <a:cs typeface="+mn-cs"/>
         </a:defRPr>
       </a:lvl2pPr>
-      <a:lvl3pPr marL="968715" algn="l" defTabSz="968715" rtl="0" eaLnBrk="1" latinLnBrk="0" hangingPunct="1">
-        <a:defRPr sz="1907" kern="1200">
+      <a:lvl3pPr marL="864017" algn="l" defTabSz="864017" rtl="0" eaLnBrk="1" latinLnBrk="0" hangingPunct="1">
+        <a:defRPr sz="1701" kern="1200">
           <a:solidFill>
             <a:schemeClr val="tx1"/>
           </a:solidFill>
@@ -3242,8 +3242,8 @@
           <a:cs typeface="+mn-cs"/>
         </a:defRPr>
       </a:lvl3pPr>
-      <a:lvl4pPr marL="1453073" algn="l" defTabSz="968715" rtl="0" eaLnBrk="1" latinLnBrk="0" hangingPunct="1">
-        <a:defRPr sz="1907" kern="1200">
+      <a:lvl4pPr marL="1296025" algn="l" defTabSz="864017" rtl="0" eaLnBrk="1" latinLnBrk="0" hangingPunct="1">
+        <a:defRPr sz="1701" kern="1200">
           <a:solidFill>
             <a:schemeClr val="tx1"/>
           </a:solidFill>
@@ -3252,8 +3252,8 @@
           <a:cs typeface="+mn-cs"/>
         </a:defRPr>
       </a:lvl4pPr>
-      <a:lvl5pPr marL="1937431" algn="l" defTabSz="968715" rtl="0" eaLnBrk="1" latinLnBrk="0" hangingPunct="1">
-        <a:defRPr sz="1907" kern="1200">
+      <a:lvl5pPr marL="1728033" algn="l" defTabSz="864017" rtl="0" eaLnBrk="1" latinLnBrk="0" hangingPunct="1">
+        <a:defRPr sz="1701" kern="1200">
           <a:solidFill>
             <a:schemeClr val="tx1"/>
           </a:solidFill>
@@ -3262,8 +3262,8 @@
           <a:cs typeface="+mn-cs"/>
         </a:defRPr>
       </a:lvl5pPr>
-      <a:lvl6pPr marL="2421788" algn="l" defTabSz="968715" rtl="0" eaLnBrk="1" latinLnBrk="0" hangingPunct="1">
-        <a:defRPr sz="1907" kern="1200">
+      <a:lvl6pPr marL="2160041" algn="l" defTabSz="864017" rtl="0" eaLnBrk="1" latinLnBrk="0" hangingPunct="1">
+        <a:defRPr sz="1701" kern="1200">
           <a:solidFill>
             <a:schemeClr val="tx1"/>
           </a:solidFill>
@@ -3272,8 +3272,8 @@
           <a:cs typeface="+mn-cs"/>
         </a:defRPr>
       </a:lvl6pPr>
-      <a:lvl7pPr marL="2906146" algn="l" defTabSz="968715" rtl="0" eaLnBrk="1" latinLnBrk="0" hangingPunct="1">
-        <a:defRPr sz="1907" kern="1200">
+      <a:lvl7pPr marL="2592050" algn="l" defTabSz="864017" rtl="0" eaLnBrk="1" latinLnBrk="0" hangingPunct="1">
+        <a:defRPr sz="1701" kern="1200">
           <a:solidFill>
             <a:schemeClr val="tx1"/>
           </a:solidFill>
@@ -3282,8 +3282,8 @@
           <a:cs typeface="+mn-cs"/>
         </a:defRPr>
       </a:lvl7pPr>
-      <a:lvl8pPr marL="3390504" algn="l" defTabSz="968715" rtl="0" eaLnBrk="1" latinLnBrk="0" hangingPunct="1">
-        <a:defRPr sz="1907" kern="1200">
+      <a:lvl8pPr marL="3024058" algn="l" defTabSz="864017" rtl="0" eaLnBrk="1" latinLnBrk="0" hangingPunct="1">
+        <a:defRPr sz="1701" kern="1200">
           <a:solidFill>
             <a:schemeClr val="tx1"/>
           </a:solidFill>
@@ -3292,8 +3292,8 @@
           <a:cs typeface="+mn-cs"/>
         </a:defRPr>
       </a:lvl8pPr>
-      <a:lvl9pPr marL="3874861" algn="l" defTabSz="968715" rtl="0" eaLnBrk="1" latinLnBrk="0" hangingPunct="1">
-        <a:defRPr sz="1907" kern="1200">
+      <a:lvl9pPr marL="3456066" algn="l" defTabSz="864017" rtl="0" eaLnBrk="1" latinLnBrk="0" hangingPunct="1">
+        <a:defRPr sz="1701" kern="1200">
           <a:solidFill>
             <a:schemeClr val="tx1"/>
           </a:solidFill>
@@ -3324,36 +3324,6 @@
           <a:chExt cx="0" cy="0"/>
         </a:xfrm>
       </p:grpSpPr>
-      <p:sp>
-        <p:nvSpPr>
-          <p:cNvPr id="3" name="Subtitle 2">
-            <a:extLst>
-              <a:ext uri="{FF2B5EF4-FFF2-40B4-BE49-F238E27FC236}">
-                <a16:creationId xmlns:a16="http://schemas.microsoft.com/office/drawing/2014/main" id="{B74915AC-2EA1-906E-DD19-6122BA700CC7}"/>
-              </a:ext>
-            </a:extLst>
-          </p:cNvPr>
-          <p:cNvSpPr>
-            <a:spLocks noGrp="1"/>
-          </p:cNvSpPr>
-          <p:nvPr>
-            <p:ph type="subTitle" idx="1"/>
-          </p:nvPr>
-        </p:nvSpPr>
-        <p:spPr>
-          <a:xfrm>
-            <a:off x="76521" y="4726843"/>
-            <a:ext cx="9533885" cy="2172804"/>
-          </a:xfrm>
-        </p:spPr>
-        <p:txBody>
-          <a:bodyPr/>
-          <a:lstStyle/>
-          <a:p>
-            <a:endParaRPr lang="en-CH"/>
-          </a:p>
-        </p:txBody>
-      </p:sp>
       <p:pic>
         <p:nvPicPr>
           <p:cNvPr id="5" name="Picture 4" descr="A graph of different types of data&#10;&#10;Description automatically generated with medium confidence">
@@ -3381,195 +3351,92 @@
         </p:blipFill>
         <p:spPr>
           <a:xfrm>
-            <a:off x="155520" y="2398295"/>
-            <a:ext cx="9401384" cy="6416759"/>
+            <a:off x="408406" y="95035"/>
+            <a:ext cx="7653151" cy="5223533"/>
           </a:xfrm>
           <a:prstGeom prst="rect">
             <a:avLst/>
           </a:prstGeom>
         </p:spPr>
       </p:pic>
-      <p:grpSp>
-        <p:nvGrpSpPr>
-          <p:cNvPr id="4" name="Group 3">
+      <p:pic>
+        <p:nvPicPr>
+          <p:cNvPr id="10" name="Graphic 9">
             <a:extLst>
               <a:ext uri="{FF2B5EF4-FFF2-40B4-BE49-F238E27FC236}">
-                <a16:creationId xmlns:a16="http://schemas.microsoft.com/office/drawing/2014/main" id="{D3A6EAE3-59CD-2E65-26B7-B979117EDDDA}"/>
+                <a16:creationId xmlns:a16="http://schemas.microsoft.com/office/drawing/2014/main" id="{EE4D7BDD-C616-B081-5542-98B13E06CF13}"/>
               </a:ext>
             </a:extLst>
           </p:cNvPr>
-          <p:cNvGrpSpPr/>
+          <p:cNvPicPr>
+            <a:picLocks noChangeAspect="1"/>
+          </p:cNvPicPr>
           <p:nvPr/>
-        </p:nvGrpSpPr>
-        <p:grpSpPr>
-          <a:xfrm>
-            <a:off x="-1" y="0"/>
-            <a:ext cx="9686926" cy="2213811"/>
-            <a:chOff x="-3" y="6135329"/>
-            <a:chExt cx="9765357" cy="1988697"/>
-          </a:xfrm>
-        </p:grpSpPr>
-        <p:sp>
-          <p:nvSpPr>
-            <p:cNvPr id="6" name="Rectangle 5">
-              <a:extLst>
-                <a:ext uri="{FF2B5EF4-FFF2-40B4-BE49-F238E27FC236}">
-                  <a16:creationId xmlns:a16="http://schemas.microsoft.com/office/drawing/2014/main" id="{8F80EAFF-37A8-7F8F-8D09-BFDD360E8D25}"/>
-                </a:ext>
-              </a:extLst>
-            </p:cNvPr>
-            <p:cNvSpPr/>
-            <p:nvPr/>
-          </p:nvSpPr>
-          <p:spPr>
-            <a:xfrm>
-              <a:off x="-3" y="6135329"/>
-              <a:ext cx="9765356" cy="1988697"/>
-            </a:xfrm>
-            <a:prstGeom prst="rect">
-              <a:avLst/>
-            </a:prstGeom>
-            <a:solidFill>
-              <a:schemeClr val="accent6">
-                <a:lumMod val="75000"/>
-              </a:schemeClr>
-            </a:solidFill>
-            <a:ln>
-              <a:noFill/>
-            </a:ln>
-          </p:spPr>
-          <p:style>
-            <a:lnRef idx="2">
-              <a:schemeClr val="accent6">
-                <a:shade val="15000"/>
-              </a:schemeClr>
-            </a:lnRef>
-            <a:fillRef idx="1">
-              <a:schemeClr val="accent6"/>
-            </a:fillRef>
-            <a:effectRef idx="0">
-              <a:schemeClr val="accent6"/>
-            </a:effectRef>
-            <a:fontRef idx="minor">
-              <a:schemeClr val="lt1"/>
-            </a:fontRef>
-          </p:style>
-          <p:txBody>
-            <a:bodyPr rtlCol="0" anchor="ctr"/>
-            <a:lstStyle/>
-            <a:p>
-              <a:pPr algn="ctr"/>
-              <a:endParaRPr lang="en-CH" sz="2362" dirty="0">
-                <a:solidFill>
-                  <a:srgbClr val="00B050"/>
-                </a:solidFill>
-              </a:endParaRPr>
-            </a:p>
-          </p:txBody>
-        </p:sp>
-        <p:sp>
-          <p:nvSpPr>
-            <p:cNvPr id="7" name="TextBox 6">
-              <a:extLst>
-                <a:ext uri="{FF2B5EF4-FFF2-40B4-BE49-F238E27FC236}">
-                  <a16:creationId xmlns:a16="http://schemas.microsoft.com/office/drawing/2014/main" id="{B2741F3C-2157-B6DF-61EC-9910CFB58970}"/>
-                </a:ext>
-              </a:extLst>
-            </p:cNvPr>
-            <p:cNvSpPr txBox="1"/>
-            <p:nvPr/>
-          </p:nvSpPr>
-          <p:spPr>
-            <a:xfrm>
-              <a:off x="156777" y="6192201"/>
-              <a:ext cx="9608577" cy="1824767"/>
-            </a:xfrm>
-            <a:prstGeom prst="rect">
-              <a:avLst/>
-            </a:prstGeom>
-            <a:noFill/>
-          </p:spPr>
-          <p:txBody>
-            <a:bodyPr wrap="square" rtlCol="0">
-              <a:spAutoFit/>
-            </a:bodyPr>
-            <a:lstStyle/>
-            <a:p>
-              <a:r>
-                <a:rPr lang="en-US" sz="4200" dirty="0">
-                  <a:solidFill>
-                    <a:schemeClr val="bg1"/>
-                  </a:solidFill>
-                  <a:latin typeface="Arial" panose="020B0604020202020204" pitchFamily="34" charset="0"/>
-                  <a:ea typeface="Roboto" panose="020F0502020204030204" pitchFamily="2" charset="0"/>
-                  <a:cs typeface="Arial" panose="020B0604020202020204" pitchFamily="34" charset="0"/>
-                </a:rPr>
-                <a:t>Warming can destabilize predator–prey interactions by shifting the functional response from Type III to Type II</a:t>
-              </a:r>
-              <a:endParaRPr lang="en-CH" sz="4200" dirty="0">
-                <a:solidFill>
-                  <a:schemeClr val="bg1"/>
-                </a:solidFill>
-                <a:latin typeface="Arial" panose="020B0604020202020204" pitchFamily="34" charset="0"/>
-                <a:ea typeface="Roboto" panose="020F0502020204030204" pitchFamily="2" charset="0"/>
-                <a:cs typeface="Arial" panose="020B0604020202020204" pitchFamily="34" charset="0"/>
-              </a:endParaRPr>
-            </a:p>
-          </p:txBody>
-        </p:sp>
-      </p:grpSp>
-      <p:sp>
-        <p:nvSpPr>
-          <p:cNvPr id="8" name="Rectangle 7">
+        </p:nvPicPr>
+        <p:blipFill>
+          <a:blip r:embed="rId3">
             <a:extLst>
-              <a:ext uri="{FF2B5EF4-FFF2-40B4-BE49-F238E27FC236}">
-                <a16:creationId xmlns:a16="http://schemas.microsoft.com/office/drawing/2014/main" id="{0B2CA9D4-88A0-C37D-ED60-EC85F99588E1}"/>
+              <a:ext uri="{28A0092B-C50C-407E-A947-70E740481C1C}">
+                <a14:useLocalDpi xmlns:a14="http://schemas.microsoft.com/office/drawing/2010/main" val="0"/>
+              </a:ext>
+              <a:ext uri="{96DAC541-7B7A-43D3-8B79-37D633B846F1}">
+                <asvg:svgBlip xmlns:asvg="http://schemas.microsoft.com/office/drawing/2016/SVG/main" r:embed="rId4"/>
               </a:ext>
             </a:extLst>
-          </p:cNvPr>
-          <p:cNvSpPr/>
-          <p:nvPr/>
-        </p:nvSpPr>
+          </a:blip>
+          <a:stretch>
+            <a:fillRect/>
+          </a:stretch>
+        </p:blipFill>
         <p:spPr>
-          <a:xfrm>
-            <a:off x="0" y="0"/>
-            <a:ext cx="9686923" cy="8999538"/>
+          <a:xfrm rot="5189719">
+            <a:off x="6444278" y="4868233"/>
+            <a:ext cx="1353539" cy="1449791"/>
           </a:xfrm>
           <a:prstGeom prst="rect">
             <a:avLst/>
           </a:prstGeom>
-          <a:noFill/>
-          <a:ln w="152400">
-            <a:solidFill>
-              <a:schemeClr val="tx1"/>
-            </a:solidFill>
-          </a:ln>
         </p:spPr>
-        <p:style>
-          <a:lnRef idx="2">
-            <a:schemeClr val="accent1">
-              <a:shade val="15000"/>
-            </a:schemeClr>
-          </a:lnRef>
-          <a:fillRef idx="1">
-            <a:schemeClr val="accent1"/>
-          </a:fillRef>
-          <a:effectRef idx="0">
-            <a:schemeClr val="accent1"/>
-          </a:effectRef>
-          <a:fontRef idx="minor">
-            <a:schemeClr val="lt1"/>
-          </a:fontRef>
-        </p:style>
-        <p:txBody>
-          <a:bodyPr rtlCol="0" anchor="ctr"/>
-          <a:lstStyle/>
-          <a:p>
-            <a:pPr algn="ctr"/>
-            <a:endParaRPr lang="en-CH"/>
-          </a:p>
-        </p:txBody>
-      </p:sp>
+      </p:pic>
+      <p:pic>
+        <p:nvPicPr>
+          <p:cNvPr id="12" name="Graphic 11">
+            <a:extLst>
+              <a:ext uri="{FF2B5EF4-FFF2-40B4-BE49-F238E27FC236}">
+                <a16:creationId xmlns:a16="http://schemas.microsoft.com/office/drawing/2014/main" id="{C86D1478-52CA-B984-A1CB-137187DAB6E1}"/>
+              </a:ext>
+            </a:extLst>
+          </p:cNvPr>
+          <p:cNvPicPr>
+            <a:picLocks noChangeAspect="1"/>
+          </p:cNvPicPr>
+          <p:nvPr/>
+        </p:nvPicPr>
+        <p:blipFill>
+          <a:blip r:embed="rId5">
+            <a:extLst>
+              <a:ext uri="{28A0092B-C50C-407E-A947-70E740481C1C}">
+                <a14:useLocalDpi xmlns:a14="http://schemas.microsoft.com/office/drawing/2010/main" val="0"/>
+              </a:ext>
+              <a:ext uri="{96DAC541-7B7A-43D3-8B79-37D633B846F1}">
+                <asvg:svgBlip xmlns:asvg="http://schemas.microsoft.com/office/drawing/2016/SVG/main" r:embed="rId6"/>
+              </a:ext>
+            </a:extLst>
+          </a:blip>
+          <a:stretch>
+            <a:fillRect/>
+          </a:stretch>
+        </p:blipFill>
+        <p:spPr>
+          <a:xfrm rot="5875893">
+            <a:off x="864942" y="4562898"/>
+            <a:ext cx="1407936" cy="1850302"/>
+          </a:xfrm>
+          <a:prstGeom prst="rect">
+            <a:avLst/>
+          </a:prstGeom>
+        </p:spPr>
+      </p:pic>
     </p:spTree>
     <p:extLst>
       <p:ext uri="{BB962C8B-B14F-4D97-AF65-F5344CB8AC3E}">

</xml_diff>